<commit_message>
Week 2 Materials updated
</commit_message>
<xml_diff>
--- a/Week1/1_Introduction.pptx
+++ b/Week1/1_Introduction.pptx
@@ -141,7 +141,7 @@
   </p:defaultTextStyle>
   <p:extLst>
     <p:ext uri="{EFAFB233-063F-42B5-8137-9DF3F51BA10A}">
-      <p15:sldGuideLst xmlns:p15="http://schemas.microsoft.com/office/powerpoint/2012/main">
+      <p15:sldGuideLst xmlns:p15="http://schemas.microsoft.com/office/powerpoint/2012/main" xmlns="">
         <p15:guide id="1" orient="horz" pos="2109">
           <p15:clr>
             <a:srgbClr val="A4A3A4"/>
@@ -3530,7 +3530,7 @@
   <p:timing>
     <p:tnLst>
       <p:par>
-        <p:cTn id="1" dur="indefinite" restart="never" nodeType="tmRoot"/>
+        <p:cTn xmlns:p14="http://schemas.microsoft.com/office/powerpoint/2010/main" id="1" dur="indefinite" restart="never" nodeType="tmRoot"/>
       </p:par>
     </p:tnLst>
   </p:timing>
@@ -3666,7 +3666,7 @@
           </a:prstGeom>
           <a:noFill/>
           <a:extLst>
-            <a:ext uri="{909E8E84-426E-40DD-AFC4-6F175D3DCCD1}">
+            <a:ext uri="{909E8E84-426E-40dd-AFC4-6F175D3DCCD1}">
               <a14:hiddenFill xmlns:a14="http://schemas.microsoft.com/office/drawing/2010/main">
                 <a:solidFill>
                   <a:srgbClr val="FFFFFF"/>
@@ -3689,7 +3689,7 @@
   <p:timing>
     <p:tnLst>
       <p:par>
-        <p:cTn id="1" dur="indefinite" restart="never" nodeType="tmRoot"/>
+        <p:cTn xmlns:p14="http://schemas.microsoft.com/office/powerpoint/2010/main" id="1" dur="indefinite" restart="never" nodeType="tmRoot"/>
       </p:par>
     </p:tnLst>
   </p:timing>
@@ -3858,7 +3858,7 @@
   <p:timing>
     <p:tnLst>
       <p:par>
-        <p:cTn id="1" dur="indefinite" restart="never" nodeType="tmRoot"/>
+        <p:cTn xmlns:p14="http://schemas.microsoft.com/office/powerpoint/2010/main" id="1" dur="indefinite" restart="never" nodeType="tmRoot"/>
       </p:par>
     </p:tnLst>
   </p:timing>
@@ -4033,9 +4033,8 @@
               </a:bodyPr>
               <a:lstStyle/>
               <a:p>
-                <a:pPr/>
                 <a14:m>
-                  <m:oMathPara xmlns:m="http://schemas.openxmlformats.org/officeDocument/2006/math">
+                  <m:oMathPara xmlns:m="http://schemas.openxmlformats.org/officeDocument/2006/math" xmlns="">
                     <m:oMathParaPr>
                       <m:jc m:val="centerGroup"/>
                     </m:oMathParaPr>
@@ -4151,7 +4150,7 @@
   <p:timing>
     <p:tnLst>
       <p:par>
-        <p:cTn id="1" dur="indefinite" restart="never" nodeType="tmRoot"/>
+        <p:cTn xmlns:p14="http://schemas.microsoft.com/office/powerpoint/2010/main" id="1" dur="indefinite" restart="never" nodeType="tmRoot"/>
       </p:par>
     </p:tnLst>
   </p:timing>
@@ -4265,7 +4264,7 @@
   <p:timing>
     <p:tnLst>
       <p:par>
-        <p:cTn id="1" dur="indefinite" restart="never" nodeType="tmRoot"/>
+        <p:cTn xmlns:p14="http://schemas.microsoft.com/office/powerpoint/2010/main" id="1" dur="indefinite" restart="never" nodeType="tmRoot"/>
       </p:par>
     </p:tnLst>
   </p:timing>
@@ -4423,9 +4422,8 @@
               </a:bodyPr>
               <a:lstStyle/>
               <a:p>
-                <a:pPr/>
                 <a14:m>
-                  <m:oMathPara xmlns:m="http://schemas.openxmlformats.org/officeDocument/2006/math">
+                  <m:oMathPara xmlns:m="http://schemas.openxmlformats.org/officeDocument/2006/math" xmlns="">
                     <m:oMathParaPr>
                       <m:jc m:val="centerGroup"/>
                     </m:oMathParaPr>
@@ -4645,9 +4643,8 @@
               </a:bodyPr>
               <a:lstStyle/>
               <a:p>
-                <a:pPr/>
                 <a14:m>
-                  <m:oMathPara xmlns:m="http://schemas.openxmlformats.org/officeDocument/2006/math">
+                  <m:oMathPara xmlns:m="http://schemas.openxmlformats.org/officeDocument/2006/math" xmlns="">
                     <m:oMathParaPr>
                       <m:jc m:val="centerGroup"/>
                     </m:oMathParaPr>
@@ -4826,9 +4823,8 @@
               </a:bodyPr>
               <a:lstStyle/>
               <a:p>
-                <a:pPr/>
                 <a14:m>
-                  <m:oMathPara xmlns:m="http://schemas.openxmlformats.org/officeDocument/2006/math">
+                  <m:oMathPara xmlns:m="http://schemas.openxmlformats.org/officeDocument/2006/math" xmlns="">
                     <m:oMathParaPr>
                       <m:jc m:val="centerGroup"/>
                     </m:oMathParaPr>
@@ -4912,7 +4908,7 @@
   <p:timing>
     <p:tnLst>
       <p:par>
-        <p:cTn id="1" dur="indefinite" restart="never" nodeType="tmRoot"/>
+        <p:cTn xmlns:p14="http://schemas.microsoft.com/office/powerpoint/2010/main" id="1" dur="indefinite" restart="never" nodeType="tmRoot"/>
       </p:par>
     </p:tnLst>
   </p:timing>
@@ -5067,9 +5063,8 @@
               </a:bodyPr>
               <a:lstStyle/>
               <a:p>
-                <a:pPr/>
                 <a14:m>
-                  <m:oMathPara xmlns:m="http://schemas.openxmlformats.org/officeDocument/2006/math">
+                  <m:oMathPara xmlns:m="http://schemas.openxmlformats.org/officeDocument/2006/math" xmlns="">
                     <m:oMathParaPr>
                       <m:jc m:val="centerGroup"/>
                     </m:oMathParaPr>
@@ -5359,7 +5354,7 @@
   <p:timing>
     <p:tnLst>
       <p:par>
-        <p:cTn id="1" dur="indefinite" restart="never" nodeType="tmRoot"/>
+        <p:cTn xmlns:p14="http://schemas.microsoft.com/office/powerpoint/2010/main" id="1" dur="indefinite" restart="never" nodeType="tmRoot"/>
       </p:par>
     </p:tnLst>
   </p:timing>
@@ -5488,9 +5483,8 @@
               </a:bodyPr>
               <a:lstStyle/>
               <a:p>
-                <a:pPr/>
                 <a14:m>
-                  <m:oMathPara xmlns:m="http://schemas.openxmlformats.org/officeDocument/2006/math">
+                  <m:oMathPara xmlns:m="http://schemas.openxmlformats.org/officeDocument/2006/math" xmlns="">
                     <m:oMathParaPr>
                       <m:jc m:val="centerGroup"/>
                     </m:oMathParaPr>
@@ -5693,9 +5687,8 @@
               </a:bodyPr>
               <a:lstStyle/>
               <a:p>
-                <a:pPr/>
                 <a14:m>
-                  <m:oMathPara xmlns:m="http://schemas.openxmlformats.org/officeDocument/2006/math">
+                  <m:oMathPara xmlns:m="http://schemas.openxmlformats.org/officeDocument/2006/math" xmlns="">
                     <m:oMathParaPr>
                       <m:jc m:val="centerGroup"/>
                     </m:oMathParaPr>
@@ -5778,9 +5771,8 @@
               </a:bodyPr>
               <a:lstStyle/>
               <a:p>
-                <a:pPr/>
                 <a14:m>
-                  <m:oMathPara xmlns:m="http://schemas.openxmlformats.org/officeDocument/2006/math">
+                  <m:oMathPara xmlns:m="http://schemas.openxmlformats.org/officeDocument/2006/math" xmlns="">
                     <m:oMathParaPr>
                       <m:jc m:val="centerGroup"/>
                     </m:oMathParaPr>
@@ -5918,7 +5910,7 @@
   <p:timing>
     <p:tnLst>
       <p:par>
-        <p:cTn id="1" dur="indefinite" restart="never" nodeType="tmRoot"/>
+        <p:cTn xmlns:p14="http://schemas.microsoft.com/office/powerpoint/2010/main" id="1" dur="indefinite" restart="never" nodeType="tmRoot"/>
       </p:par>
     </p:tnLst>
   </p:timing>
@@ -6033,7 +6025,7 @@
   <p:timing>
     <p:tnLst>
       <p:par>
-        <p:cTn id="1" dur="indefinite" restart="never" nodeType="tmRoot"/>
+        <p:cTn xmlns:p14="http://schemas.microsoft.com/office/powerpoint/2010/main" id="1" dur="indefinite" restart="never" nodeType="tmRoot"/>
       </p:par>
     </p:tnLst>
   </p:timing>
@@ -6195,9 +6187,8 @@
               </a:bodyPr>
               <a:lstStyle/>
               <a:p>
-                <a:pPr/>
                 <a14:m>
-                  <m:oMathPara xmlns:m="http://schemas.openxmlformats.org/officeDocument/2006/math">
+                  <m:oMathPara xmlns:m="http://schemas.openxmlformats.org/officeDocument/2006/math" xmlns="">
                     <m:oMathParaPr>
                       <m:jc m:val="centerGroup"/>
                     </m:oMathParaPr>
@@ -6486,7 +6477,7 @@
   <p:timing>
     <p:tnLst>
       <p:par>
-        <p:cTn id="1" dur="indefinite" restart="never" nodeType="tmRoot"/>
+        <p:cTn xmlns:p14="http://schemas.microsoft.com/office/powerpoint/2010/main" id="1" dur="indefinite" restart="never" nodeType="tmRoot"/>
       </p:par>
     </p:tnLst>
   </p:timing>
@@ -6541,7 +6532,7 @@
           </a:prstGeom>
           <a:noFill/>
           <a:extLst>
-            <a:ext uri="{909E8E84-426E-40DD-AFC4-6F175D3DCCD1}">
+            <a:ext uri="{909E8E84-426E-40dd-AFC4-6F175D3DCCD1}">
               <a14:hiddenFill xmlns:a14="http://schemas.microsoft.com/office/drawing/2010/main">
                 <a:solidFill>
                   <a:srgbClr val="FFFFFF"/>
@@ -6666,9 +6657,8 @@
               </a:bodyPr>
               <a:lstStyle/>
               <a:p>
-                <a:pPr/>
                 <a14:m>
-                  <m:oMathPara xmlns:m="http://schemas.openxmlformats.org/officeDocument/2006/math">
+                  <m:oMathPara xmlns:m="http://schemas.openxmlformats.org/officeDocument/2006/math" xmlns="">
                     <m:oMathParaPr>
                       <m:jc m:val="centerGroup"/>
                     </m:oMathParaPr>
@@ -6956,7 +6946,7 @@
   <p:timing>
     <p:tnLst>
       <p:par>
-        <p:cTn id="1" dur="indefinite" restart="never" nodeType="tmRoot"/>
+        <p:cTn xmlns:p14="http://schemas.microsoft.com/office/powerpoint/2010/main" id="1" dur="indefinite" restart="never" nodeType="tmRoot"/>
       </p:par>
     </p:tnLst>
   </p:timing>
@@ -7017,7 +7007,7 @@
   <p:timing>
     <p:tnLst>
       <p:par>
-        <p:cTn id="1" dur="indefinite" restart="never" nodeType="tmRoot"/>
+        <p:cTn xmlns:p14="http://schemas.microsoft.com/office/powerpoint/2010/main" id="1" dur="indefinite" restart="never" nodeType="tmRoot"/>
       </p:par>
     </p:tnLst>
   </p:timing>
@@ -7147,7 +7137,7 @@
   <p:timing>
     <p:tnLst>
       <p:par>
-        <p:cTn id="1" dur="indefinite" restart="never" nodeType="tmRoot"/>
+        <p:cTn xmlns:p14="http://schemas.microsoft.com/office/powerpoint/2010/main" id="1" dur="indefinite" restart="never" nodeType="tmRoot"/>
       </p:par>
     </p:tnLst>
   </p:timing>
@@ -7267,7 +7257,7 @@
   <p:timing>
     <p:tnLst>
       <p:par>
-        <p:cTn id="1" dur="indefinite" restart="never" nodeType="tmRoot"/>
+        <p:cTn xmlns:p14="http://schemas.microsoft.com/office/powerpoint/2010/main" id="1" dur="indefinite" restart="never" nodeType="tmRoot"/>
       </p:par>
     </p:tnLst>
   </p:timing>
@@ -7376,7 +7366,7 @@
   <p:timing>
     <p:tnLst>
       <p:par>
-        <p:cTn id="1" dur="indefinite" restart="never" nodeType="tmRoot"/>
+        <p:cTn xmlns:p14="http://schemas.microsoft.com/office/powerpoint/2010/main" id="1" dur="indefinite" restart="never" nodeType="tmRoot"/>
       </p:par>
     </p:tnLst>
   </p:timing>
@@ -7445,13 +7435,8 @@
           <a:p>
             <a:r>
               <a:rPr lang="en-US" dirty="0" smtClean="0"/>
-              <a:t>IQR(): inner quartile </a:t>
-            </a:r>
-            <a:r>
-              <a:rPr lang="en-US" dirty="0" smtClean="0"/>
-              <a:t>range (Q3 – Q1)</a:t>
-            </a:r>
-            <a:endParaRPr lang="en-US" dirty="0" smtClean="0"/>
+              <a:t>IQR(): inner quartile range (Q3 – Q1)</a:t>
+            </a:r>
           </a:p>
         </p:txBody>
       </p:sp>
@@ -7497,7 +7482,7 @@
   <p:timing>
     <p:tnLst>
       <p:par>
-        <p:cTn id="1" dur="indefinite" restart="never" nodeType="tmRoot"/>
+        <p:cTn xmlns:p14="http://schemas.microsoft.com/office/powerpoint/2010/main" id="1" dur="indefinite" restart="never" nodeType="tmRoot"/>
       </p:par>
     </p:tnLst>
   </p:timing>
@@ -7636,7 +7621,7 @@
   <p:timing>
     <p:tnLst>
       <p:par>
-        <p:cTn id="1" dur="indefinite" restart="never" nodeType="tmRoot"/>
+        <p:cTn xmlns:p14="http://schemas.microsoft.com/office/powerpoint/2010/main" id="1" dur="indefinite" restart="never" nodeType="tmRoot"/>
       </p:par>
     </p:tnLst>
   </p:timing>
@@ -7791,9 +7776,8 @@
               </a:bodyPr>
               <a:lstStyle/>
               <a:p>
-                <a:pPr/>
                 <a14:m>
-                  <m:oMathPara xmlns:m="http://schemas.openxmlformats.org/officeDocument/2006/math">
+                  <m:oMathPara xmlns:m="http://schemas.openxmlformats.org/officeDocument/2006/math" xmlns="">
                     <m:oMathParaPr>
                       <m:jc m:val="centerGroup"/>
                     </m:oMathParaPr>
@@ -8010,7 +7994,7 @@
   <p:timing>
     <p:tnLst>
       <p:par>
-        <p:cTn id="1" dur="indefinite" restart="never" nodeType="tmRoot"/>
+        <p:cTn xmlns:p14="http://schemas.microsoft.com/office/powerpoint/2010/main" id="1" dur="indefinite" restart="never" nodeType="tmRoot"/>
       </p:par>
     </p:tnLst>
   </p:timing>
@@ -8145,7 +8129,19 @@
             <a:pPr lvl="1"/>
             <a:r>
               <a:rPr lang="en-US" dirty="0" smtClean="0"/>
-              <a:t>Bounded between 0 and 1.</a:t>
+              <a:t>Bounded </a:t>
+            </a:r>
+            <a:r>
+              <a:rPr lang="en-US" smtClean="0"/>
+              <a:t>between </a:t>
+            </a:r>
+            <a:r>
+              <a:rPr lang="en-US" smtClean="0"/>
+              <a:t>-1 </a:t>
+            </a:r>
+            <a:r>
+              <a:rPr lang="en-US" dirty="0" smtClean="0"/>
+              <a:t>and 1.</a:t>
             </a:r>
           </a:p>
           <a:p>
@@ -8181,9 +8177,8 @@
               </a:bodyPr>
               <a:lstStyle/>
               <a:p>
-                <a:pPr/>
                 <a14:m>
-                  <m:oMathPara xmlns:m="http://schemas.openxmlformats.org/officeDocument/2006/math">
+                  <m:oMathPara xmlns:m="http://schemas.openxmlformats.org/officeDocument/2006/math" xmlns="">
                     <m:oMathParaPr>
                       <m:jc m:val="centerGroup"/>
                     </m:oMathParaPr>
@@ -8465,7 +8460,7 @@
   <p:timing>
     <p:tnLst>
       <p:par>
-        <p:cTn id="1" dur="indefinite" restart="never" nodeType="tmRoot"/>
+        <p:cTn xmlns:p14="http://schemas.microsoft.com/office/powerpoint/2010/main" id="1" dur="indefinite" restart="never" nodeType="tmRoot"/>
       </p:par>
     </p:tnLst>
   </p:timing>
@@ -8665,7 +8660,7 @@
   <p:timing>
     <p:tnLst>
       <p:par>
-        <p:cTn id="1" dur="indefinite" restart="never" nodeType="tmRoot"/>
+        <p:cTn xmlns:p14="http://schemas.microsoft.com/office/powerpoint/2010/main" id="1" dur="indefinite" restart="never" nodeType="tmRoot"/>
       </p:par>
     </p:tnLst>
   </p:timing>
@@ -8892,7 +8887,7 @@
   <p:timing>
     <p:tnLst>
       <p:par>
-        <p:cTn id="1" dur="indefinite" restart="never" nodeType="tmRoot"/>
+        <p:cTn xmlns:p14="http://schemas.microsoft.com/office/powerpoint/2010/main" id="1" dur="indefinite" restart="never" nodeType="tmRoot"/>
       </p:par>
     </p:tnLst>
   </p:timing>
@@ -9149,7 +9144,7 @@
   <p:timing>
     <p:tnLst>
       <p:par>
-        <p:cTn id="1" dur="indefinite" restart="never" nodeType="tmRoot"/>
+        <p:cTn xmlns:p14="http://schemas.microsoft.com/office/powerpoint/2010/main" id="1" dur="indefinite" restart="never" nodeType="tmRoot"/>
       </p:par>
     </p:tnLst>
   </p:timing>
@@ -9308,7 +9303,7 @@
   <p:timing>
     <p:tnLst>
       <p:par>
-        <p:cTn id="1" dur="indefinite" restart="never" nodeType="tmRoot"/>
+        <p:cTn xmlns:p14="http://schemas.microsoft.com/office/powerpoint/2010/main" id="1" dur="indefinite" restart="never" nodeType="tmRoot"/>
       </p:par>
     </p:tnLst>
   </p:timing>
@@ -9503,7 +9498,7 @@
   <p:timing>
     <p:tnLst>
       <p:par>
-        <p:cTn id="1" dur="indefinite" restart="never" nodeType="tmRoot"/>
+        <p:cTn xmlns:p14="http://schemas.microsoft.com/office/powerpoint/2010/main" id="1" dur="indefinite" restart="never" nodeType="tmRoot"/>
       </p:par>
     </p:tnLst>
   </p:timing>
@@ -9652,7 +9647,7 @@
   <p:timing>
     <p:tnLst>
       <p:par>
-        <p:cTn id="1" dur="indefinite" restart="never" nodeType="tmRoot"/>
+        <p:cTn xmlns:p14="http://schemas.microsoft.com/office/powerpoint/2010/main" id="1" dur="indefinite" restart="never" nodeType="tmRoot"/>
       </p:par>
     </p:tnLst>
   </p:timing>
@@ -9791,7 +9786,7 @@
   <p:timing>
     <p:tnLst>
       <p:par>
-        <p:cTn id="1" dur="indefinite" restart="never" nodeType="tmRoot"/>
+        <p:cTn xmlns:p14="http://schemas.microsoft.com/office/powerpoint/2010/main" id="1" dur="indefinite" restart="never" nodeType="tmRoot"/>
       </p:par>
     </p:tnLst>
   </p:timing>
@@ -9896,7 +9891,7 @@
   <p:timing>
     <p:tnLst>
       <p:par>
-        <p:cTn id="1" dur="indefinite" restart="never" nodeType="tmRoot"/>
+        <p:cTn xmlns:p14="http://schemas.microsoft.com/office/powerpoint/2010/main" id="1" dur="indefinite" restart="never" nodeType="tmRoot"/>
       </p:par>
     </p:tnLst>
   </p:timing>
@@ -10048,7 +10043,7 @@
   <p:timing>
     <p:tnLst>
       <p:par>
-        <p:cTn id="1" dur="indefinite" restart="never" nodeType="tmRoot"/>
+        <p:cTn xmlns:p14="http://schemas.microsoft.com/office/powerpoint/2010/main" id="1" dur="indefinite" restart="never" nodeType="tmRoot"/>
       </p:par>
     </p:tnLst>
   </p:timing>
@@ -10143,7 +10138,7 @@
   <p:timing>
     <p:tnLst>
       <p:par>
-        <p:cTn id="1" dur="indefinite" restart="never" nodeType="tmRoot"/>
+        <p:cTn xmlns:p14="http://schemas.microsoft.com/office/powerpoint/2010/main" id="1" dur="indefinite" restart="never" nodeType="tmRoot"/>
       </p:par>
     </p:tnLst>
   </p:timing>
@@ -10227,7 +10222,7 @@
   <p:timing>
     <p:tnLst>
       <p:par>
-        <p:cTn id="1" dur="indefinite" restart="never" nodeType="tmRoot"/>
+        <p:cTn xmlns:p14="http://schemas.microsoft.com/office/powerpoint/2010/main" id="1" dur="indefinite" restart="never" nodeType="tmRoot"/>
       </p:par>
     </p:tnLst>
   </p:timing>
@@ -10390,7 +10385,7 @@
   <p:timing>
     <p:tnLst>
       <p:par>
-        <p:cTn id="1" dur="indefinite" restart="never" nodeType="tmRoot"/>
+        <p:cTn xmlns:p14="http://schemas.microsoft.com/office/powerpoint/2010/main" id="1" dur="indefinite" restart="never" nodeType="tmRoot"/>
       </p:par>
     </p:tnLst>
   </p:timing>
@@ -10521,7 +10516,7 @@
   <p:timing>
     <p:tnLst>
       <p:par>
-        <p:cTn id="1" dur="indefinite" restart="never" nodeType="tmRoot"/>
+        <p:cTn xmlns:p14="http://schemas.microsoft.com/office/powerpoint/2010/main" id="1" dur="indefinite" restart="never" nodeType="tmRoot"/>
       </p:par>
     </p:tnLst>
   </p:timing>
@@ -10703,7 +10698,7 @@
   <p:timing>
     <p:tnLst>
       <p:par>
-        <p:cTn id="1" dur="indefinite" restart="never" nodeType="tmRoot"/>
+        <p:cTn xmlns:p14="http://schemas.microsoft.com/office/powerpoint/2010/main" id="1" dur="indefinite" restart="never" nodeType="tmRoot"/>
       </p:par>
     </p:tnLst>
   </p:timing>
@@ -10787,7 +10782,7 @@
   <p:timing>
     <p:tnLst>
       <p:par>
-        <p:cTn id="1" dur="indefinite" restart="never" nodeType="tmRoot"/>
+        <p:cTn xmlns:p14="http://schemas.microsoft.com/office/powerpoint/2010/main" id="1" dur="indefinite" restart="never" nodeType="tmRoot"/>
       </p:par>
     </p:tnLst>
   </p:timing>
@@ -11029,7 +11024,7 @@
   <p:timing>
     <p:tnLst>
       <p:par>
-        <p:cTn id="1" dur="indefinite" restart="never" nodeType="tmRoot"/>
+        <p:cTn xmlns:p14="http://schemas.microsoft.com/office/powerpoint/2010/main" id="1" dur="indefinite" restart="never" nodeType="tmRoot"/>
       </p:par>
     </p:tnLst>
   </p:timing>

</xml_diff>